<commit_message>
Added info to the WUTDemo PowerPoint
</commit_message>
<xml_diff>
--- a/WUTDemo.pptx
+++ b/WUTDemo.pptx
@@ -9,8 +9,8 @@
     <p:sldId id="258" r:id="rId3"/>
     <p:sldId id="257" r:id="rId4"/>
     <p:sldId id="264" r:id="rId5"/>
-    <p:sldId id="259" r:id="rId6"/>
-    <p:sldId id="260" r:id="rId7"/>
+    <p:sldId id="265" r:id="rId6"/>
+    <p:sldId id="266" r:id="rId7"/>
     <p:sldId id="261" r:id="rId8"/>
     <p:sldId id="262" r:id="rId9"/>
     <p:sldId id="263" r:id="rId10"/>
@@ -3037,8 +3037,8 @@
         </p:blipFill>
         <p:spPr>
           <a:xfrm>
-            <a:off x="2667000" y="0"/>
-            <a:ext cx="6858000" cy="6858000"/>
+            <a:off x="655984" y="80963"/>
+            <a:ext cx="10843590" cy="6858000"/>
           </a:xfrm>
           <a:prstGeom prst="rect">
             <a:avLst/>
@@ -3343,35 +3343,107 @@
           <a:p>
             <a:r>
               <a:rPr lang="en-US" dirty="0" smtClean="0"/>
-              <a:t>WUT?  Database</a:t>
+              <a:t>WUT?</a:t>
+            </a:r>
+            <a:br>
+              <a:rPr lang="en-US" dirty="0" smtClean="0"/>
+            </a:br>
+            <a:r>
+              <a:rPr lang="en-US" dirty="0" smtClean="0"/>
+              <a:t>Database</a:t>
             </a:r>
             <a:endParaRPr lang="en-US" dirty="0"/>
           </a:p>
         </p:txBody>
       </p:sp>
-      <p:sp>
-        <p:nvSpPr>
-          <p:cNvPr id="3" name="Content Placeholder 2"/>
-          <p:cNvSpPr>
-            <a:spLocks noGrp="1"/>
-          </p:cNvSpPr>
+      <p:pic>
+        <p:nvPicPr>
+          <p:cNvPr id="5" name="Content Placeholder 4"/>
+          <p:cNvPicPr>
+            <a:picLocks noGrp="1" noChangeAspect="1"/>
+          </p:cNvPicPr>
           <p:nvPr>
             <p:ph idx="1"/>
           </p:nvPr>
-        </p:nvSpPr>
-        <p:spPr/>
-        <p:txBody>
-          <a:bodyPr/>
-          <a:lstStyle/>
-          <a:p>
-            <a:endParaRPr lang="en-US"/>
+        </p:nvPicPr>
+        <p:blipFill>
+          <a:blip r:embed="rId2"/>
+          <a:stretch>
+            <a:fillRect/>
+          </a:stretch>
+        </p:blipFill>
+        <p:spPr>
+          <a:xfrm>
+            <a:off x="5183188" y="1043608"/>
+            <a:ext cx="6172200" cy="4825379"/>
+          </a:xfrm>
+          <a:prstGeom prst="rect">
+            <a:avLst/>
+          </a:prstGeom>
+        </p:spPr>
+      </p:pic>
+      <p:sp>
+        <p:nvSpPr>
+          <p:cNvPr id="4" name="Text Placeholder 3"/>
+          <p:cNvSpPr>
+            <a:spLocks noGrp="1"/>
+          </p:cNvSpPr>
+          <p:nvPr>
+            <p:ph type="body" sz="half" idx="2"/>
+          </p:nvPr>
+        </p:nvSpPr>
+        <p:spPr/>
+        <p:txBody>
+          <a:bodyPr/>
+          <a:lstStyle/>
+          <a:p>
+            <a:endParaRPr lang="en-US" dirty="0" smtClean="0"/>
+          </a:p>
+          <a:p>
+            <a:r>
+              <a:rPr lang="en-US" dirty="0" smtClean="0"/>
+              <a:t>Microsoft SQL Server</a:t>
+            </a:r>
+          </a:p>
+          <a:p>
+            <a:r>
+              <a:rPr lang="en-US" dirty="0" smtClean="0"/>
+              <a:t>Database: Trivia</a:t>
+            </a:r>
+          </a:p>
+          <a:p>
+            <a:r>
+              <a:rPr lang="en-US" dirty="0" smtClean="0"/>
+              <a:t>Table:  question</a:t>
+            </a:r>
+          </a:p>
+          <a:p>
+            <a:r>
+              <a:rPr lang="en-US" dirty="0" smtClean="0"/>
+              <a:t>Field:  </a:t>
+            </a:r>
+            <a:r>
+              <a:rPr lang="en-US" dirty="0" err="1" smtClean="0"/>
+              <a:t>question_text</a:t>
+            </a:r>
+            <a:endParaRPr lang="en-US" dirty="0" smtClean="0"/>
+          </a:p>
+          <a:p>
+            <a:r>
+              <a:rPr lang="en-US" dirty="0" err="1" smtClean="0"/>
+              <a:t>question_text</a:t>
+            </a:r>
+            <a:r>
+              <a:rPr lang="en-US" dirty="0" smtClean="0"/>
+              <a:t> contains all the opinion questions for the game.</a:t>
+            </a:r>
           </a:p>
         </p:txBody>
       </p:sp>
     </p:spTree>
     <p:extLst>
       <p:ext uri="{BB962C8B-B14F-4D97-AF65-F5344CB8AC3E}">
-        <p14:creationId xmlns:p14="http://schemas.microsoft.com/office/powerpoint/2010/main" val="3994993265"/>
+        <p14:creationId xmlns:p14="http://schemas.microsoft.com/office/powerpoint/2010/main" val="750060558"/>
       </p:ext>
     </p:extLst>
   </p:cSld>
@@ -3414,36 +3486,139 @@
           <a:lstStyle/>
           <a:p>
             <a:r>
+              <a:rPr lang="en-US" dirty="0"/>
+              <a:t>WUT?  Seamless GUI Transitions</a:t>
+            </a:r>
+          </a:p>
+        </p:txBody>
+      </p:sp>
+      <p:sp>
+        <p:nvSpPr>
+          <p:cNvPr id="3" name="Content Placeholder 2"/>
+          <p:cNvSpPr>
+            <a:spLocks noGrp="1"/>
+          </p:cNvSpPr>
+          <p:nvPr>
+            <p:ph sz="half" idx="1"/>
+          </p:nvPr>
+        </p:nvSpPr>
+        <p:spPr/>
+        <p:txBody>
+          <a:bodyPr/>
+          <a:lstStyle/>
+          <a:p>
+            <a:pPr marL="0" indent="0">
+              <a:buNone/>
+            </a:pPr>
+            <a:r>
+              <a:rPr lang="en-US" dirty="0"/>
+              <a:t>The Window and </a:t>
+            </a:r>
+            <a:r>
+              <a:rPr lang="en-US" dirty="0" err="1"/>
+              <a:t>JFrame</a:t>
+            </a:r>
+            <a:r>
+              <a:rPr lang="en-US" dirty="0"/>
+              <a:t> remains constant </a:t>
+            </a:r>
+            <a:r>
               <a:rPr lang="en-US" dirty="0" smtClean="0"/>
-              <a:t>WUT?  Seamless GUI Transitions</a:t>
+              <a:t>throughout </a:t>
+            </a:r>
+            <a:r>
+              <a:rPr lang="en-US" dirty="0"/>
+              <a:t>the game</a:t>
+            </a:r>
+            <a:r>
+              <a:rPr lang="en-US" dirty="0" smtClean="0"/>
+              <a:t>.</a:t>
+            </a:r>
+          </a:p>
+          <a:p>
+            <a:pPr marL="0" indent="0">
+              <a:buNone/>
+            </a:pPr>
+            <a:r>
+              <a:rPr lang="en-US" dirty="0" smtClean="0"/>
+              <a:t>The </a:t>
+            </a:r>
+            <a:r>
+              <a:rPr lang="en-US" dirty="0" err="1" smtClean="0"/>
+              <a:t>JPanels</a:t>
+            </a:r>
+            <a:r>
+              <a:rPr lang="en-US" dirty="0" smtClean="0"/>
+              <a:t> changes for each GUI screen.</a:t>
             </a:r>
             <a:endParaRPr lang="en-US" dirty="0"/>
           </a:p>
-        </p:txBody>
-      </p:sp>
-      <p:sp>
-        <p:nvSpPr>
-          <p:cNvPr id="3" name="Content Placeholder 2"/>
-          <p:cNvSpPr>
-            <a:spLocks noGrp="1"/>
-          </p:cNvSpPr>
-          <p:nvPr>
-            <p:ph idx="1"/>
-          </p:nvPr>
-        </p:nvSpPr>
-        <p:spPr/>
-        <p:txBody>
-          <a:bodyPr/>
-          <a:lstStyle/>
-          <a:p>
+          <a:p>
+            <a:pPr marL="0" indent="0">
+              <a:buNone/>
+            </a:pPr>
+            <a:r>
+              <a:rPr lang="en-US" dirty="0" smtClean="0"/>
+              <a:t>Each </a:t>
+            </a:r>
+            <a:r>
+              <a:rPr lang="en-US" dirty="0"/>
+              <a:t>GUI </a:t>
+            </a:r>
+            <a:r>
+              <a:rPr lang="en-US" dirty="0" smtClean="0"/>
+              <a:t>screen is a subclass of </a:t>
+            </a:r>
+            <a:r>
+              <a:rPr lang="en-US" dirty="0" err="1" smtClean="0"/>
+              <a:t>GamePanel</a:t>
+            </a:r>
+            <a:r>
+              <a:rPr lang="en-US" dirty="0" smtClean="0"/>
+              <a:t>, a subclass of </a:t>
+            </a:r>
+            <a:r>
+              <a:rPr lang="en-US" dirty="0" err="1" smtClean="0"/>
+              <a:t>JPanel</a:t>
+            </a:r>
+            <a:r>
+              <a:rPr lang="en-US" dirty="0" smtClean="0"/>
+              <a:t>.</a:t>
+            </a:r>
             <a:endParaRPr lang="en-US" dirty="0"/>
           </a:p>
         </p:txBody>
       </p:sp>
+      <p:pic>
+        <p:nvPicPr>
+          <p:cNvPr id="5" name="Content Placeholder 4"/>
+          <p:cNvPicPr>
+            <a:picLocks noGrp="1" noChangeAspect="1"/>
+          </p:cNvPicPr>
+          <p:nvPr>
+            <p:ph sz="half" idx="2"/>
+          </p:nvPr>
+        </p:nvPicPr>
+        <p:blipFill>
+          <a:blip r:embed="rId2"/>
+          <a:stretch>
+            <a:fillRect/>
+          </a:stretch>
+        </p:blipFill>
+        <p:spPr>
+          <a:xfrm>
+            <a:off x="6591300" y="1825625"/>
+            <a:ext cx="4343400" cy="3823494"/>
+          </a:xfrm>
+          <a:prstGeom prst="rect">
+            <a:avLst/>
+          </a:prstGeom>
+        </p:spPr>
+      </p:pic>
     </p:spTree>
     <p:extLst>
       <p:ext uri="{BB962C8B-B14F-4D97-AF65-F5344CB8AC3E}">
-        <p14:creationId xmlns:p14="http://schemas.microsoft.com/office/powerpoint/2010/main" val="1250865250"/>
+        <p14:creationId xmlns:p14="http://schemas.microsoft.com/office/powerpoint/2010/main" val="2554521532"/>
       </p:ext>
     </p:extLst>
   </p:cSld>
@@ -3487,7 +3662,11 @@
           <a:p>
             <a:r>
               <a:rPr lang="en-US" dirty="0" smtClean="0"/>
-              <a:t>WUT?  Sound Effects</a:t>
+              <a:t>WUT?  Sound </a:t>
+            </a:r>
+            <a:r>
+              <a:rPr lang="en-US" dirty="0" smtClean="0"/>
+              <a:t>Effects and Graphics</a:t>
             </a:r>
             <a:endParaRPr lang="en-US" dirty="0"/>
           </a:p>
@@ -3508,7 +3687,7 @@
           <a:bodyPr/>
           <a:lstStyle/>
           <a:p>
-            <a:endParaRPr lang="en-US"/>
+            <a:endParaRPr lang="en-US" dirty="0"/>
           </a:p>
         </p:txBody>
       </p:sp>

</xml_diff>